<commit_message>
Aula 01 IoT ...
</commit_message>
<xml_diff>
--- a/01 Classes/Aula 01 - Aplicação Cloud Indústria 40 Python.pptx
+++ b/01 Classes/Aula 01 - Aplicação Cloud Indústria 40 Python.pptx
@@ -5,7 +5,7 @@
     <p:sldMasterId id="2147483648" r:id="rId1"/>
   </p:sldMasterIdLst>
   <p:notesMasterIdLst>
-    <p:notesMasterId r:id="rId25"/>
+    <p:notesMasterId r:id="rId26"/>
   </p:notesMasterIdLst>
   <p:sldIdLst>
     <p:sldId id="256" r:id="rId2"/>
@@ -26,11 +26,12 @@
     <p:sldId id="351" r:id="rId17"/>
     <p:sldId id="350" r:id="rId18"/>
     <p:sldId id="344" r:id="rId19"/>
-    <p:sldId id="333" r:id="rId20"/>
-    <p:sldId id="323" r:id="rId21"/>
-    <p:sldId id="334" r:id="rId22"/>
-    <p:sldId id="337" r:id="rId23"/>
-    <p:sldId id="342" r:id="rId24"/>
+    <p:sldId id="357" r:id="rId20"/>
+    <p:sldId id="333" r:id="rId21"/>
+    <p:sldId id="323" r:id="rId22"/>
+    <p:sldId id="334" r:id="rId23"/>
+    <p:sldId id="337" r:id="rId24"/>
+    <p:sldId id="342" r:id="rId25"/>
   </p:sldIdLst>
   <p:sldSz cx="9144000" cy="5143500" type="screen16x9"/>
   <p:notesSz cx="6858000" cy="9144000"/>
@@ -1161,7 +1162,7 @@
     </p:spTree>
     <p:extLst>
       <p:ext uri="{BB962C8B-B14F-4D97-AF65-F5344CB8AC3E}">
-        <p14:creationId xmlns:p14="http://schemas.microsoft.com/office/powerpoint/2010/main" val="585304384"/>
+        <p14:creationId xmlns:p14="http://schemas.microsoft.com/office/powerpoint/2010/main" val="3558809483"/>
       </p:ext>
     </p:extLst>
   </p:cSld>
@@ -1227,7 +1228,7 @@
     </p:spTree>
     <p:extLst>
       <p:ext uri="{BB962C8B-B14F-4D97-AF65-F5344CB8AC3E}">
-        <p14:creationId xmlns:p14="http://schemas.microsoft.com/office/powerpoint/2010/main" val="2709569597"/>
+        <p14:creationId xmlns:p14="http://schemas.microsoft.com/office/powerpoint/2010/main" val="585304384"/>
       </p:ext>
     </p:extLst>
   </p:cSld>
@@ -1359,6 +1360,72 @@
     </p:spTree>
     <p:extLst>
       <p:ext uri="{BB962C8B-B14F-4D97-AF65-F5344CB8AC3E}">
+        <p14:creationId xmlns:p14="http://schemas.microsoft.com/office/powerpoint/2010/main" val="2709569597"/>
+      </p:ext>
+    </p:extLst>
+  </p:cSld>
+  <p:clrMapOvr>
+    <a:masterClrMapping/>
+  </p:clrMapOvr>
+</p:notes>
+</file>
+
+<file path=ppt/notesSlides/notesSlide21.xml><?xml version="1.0" encoding="utf-8"?>
+<p:notes xmlns:a="http://schemas.openxmlformats.org/drawingml/2006/main" xmlns:r="http://schemas.openxmlformats.org/officeDocument/2006/relationships" xmlns:p="http://schemas.openxmlformats.org/presentationml/2006/main">
+  <p:cSld>
+    <p:spTree>
+      <p:nvGrpSpPr>
+        <p:cNvPr id="1" name=""/>
+        <p:cNvGrpSpPr/>
+        <p:nvPr/>
+      </p:nvGrpSpPr>
+      <p:grpSpPr>
+        <a:xfrm>
+          <a:off x="0" y="0"/>
+          <a:ext cx="0" cy="0"/>
+          <a:chOff x="0" y="0"/>
+          <a:chExt cx="0" cy="0"/>
+        </a:xfrm>
+      </p:grpSpPr>
+      <p:sp>
+        <p:nvSpPr>
+          <p:cNvPr id="2" name="Espaço Reservado para Imagem de Slide 1"/>
+          <p:cNvSpPr>
+            <a:spLocks noGrp="1" noRot="1" noChangeAspect="1"/>
+          </p:cNvSpPr>
+          <p:nvPr>
+            <p:ph type="sldImg"/>
+          </p:nvPr>
+        </p:nvSpPr>
+        <p:spPr>
+          <a:xfrm>
+            <a:off x="381000" y="685800"/>
+            <a:ext cx="6096000" cy="3429000"/>
+          </a:xfrm>
+        </p:spPr>
+      </p:sp>
+      <p:sp>
+        <p:nvSpPr>
+          <p:cNvPr id="3" name="Espaço Reservado para Anotações 2"/>
+          <p:cNvSpPr>
+            <a:spLocks noGrp="1"/>
+          </p:cNvSpPr>
+          <p:nvPr>
+            <p:ph type="body" idx="1"/>
+          </p:nvPr>
+        </p:nvSpPr>
+        <p:spPr/>
+        <p:txBody>
+          <a:bodyPr/>
+          <a:lstStyle/>
+          <a:p>
+            <a:endParaRPr lang="pt-BR" dirty="0"/>
+          </a:p>
+        </p:txBody>
+      </p:sp>
+    </p:spTree>
+    <p:extLst>
+      <p:ext uri="{BB962C8B-B14F-4D97-AF65-F5344CB8AC3E}">
         <p14:creationId xmlns:p14="http://schemas.microsoft.com/office/powerpoint/2010/main" val="2296249050"/>
       </p:ext>
     </p:extLst>
@@ -1369,7 +1436,7 @@
 </p:notes>
 </file>
 
-<file path=ppt/notesSlides/notesSlide21.xml><?xml version="1.0" encoding="utf-8"?>
+<file path=ppt/notesSlides/notesSlide22.xml><?xml version="1.0" encoding="utf-8"?>
 <p:notes xmlns:a="http://schemas.openxmlformats.org/drawingml/2006/main" xmlns:r="http://schemas.openxmlformats.org/officeDocument/2006/relationships" xmlns:p="http://schemas.openxmlformats.org/presentationml/2006/main">
   <p:cSld>
     <p:spTree>
@@ -7181,6 +7248,16 @@
               <a:buChar char="§"/>
             </a:pPr>
             <a:r>
+              <a:rPr lang="pt-BR" sz="2000" b="1" dirty="0">
+                <a:solidFill>
+                  <a:schemeClr val="tx1"/>
+                </a:solidFill>
+                <a:latin typeface="Times New Roman" panose="02020603050405020304" pitchFamily="18" charset="0"/>
+                <a:cs typeface="Times New Roman" panose="02020603050405020304" pitchFamily="18" charset="0"/>
+              </a:rPr>
+              <a:t>Plataforma Arduíno </a:t>
+            </a:r>
+            <a:r>
               <a:rPr lang="pt-BR" sz="2000" dirty="0">
                 <a:solidFill>
                   <a:schemeClr val="tx1"/>
@@ -7188,7 +7265,22 @@
                 <a:latin typeface="Times New Roman" panose="02020603050405020304" pitchFamily="18" charset="0"/>
                 <a:cs typeface="Times New Roman" panose="02020603050405020304" pitchFamily="18" charset="0"/>
               </a:rPr>
-              <a:t>Oracle </a:t>
+              <a:t>com Python</a:t>
+            </a:r>
+          </a:p>
+          <a:p>
+            <a:pPr marL="457200" lvl="1" indent="0" algn="just">
+              <a:buNone/>
+            </a:pPr>
+            <a:r>
+              <a:rPr lang="pt-BR" sz="2000" dirty="0">
+                <a:solidFill>
+                  <a:schemeClr val="tx1"/>
+                </a:solidFill>
+                <a:latin typeface="Times New Roman" panose="02020603050405020304" pitchFamily="18" charset="0"/>
+                <a:cs typeface="Times New Roman" panose="02020603050405020304" pitchFamily="18" charset="0"/>
+              </a:rPr>
+              <a:t>Plataforma open </a:t>
             </a:r>
             <a:r>
               <a:rPr lang="pt-BR" sz="2000" dirty="0" err="1">
@@ -7198,7 +7290,7 @@
                 <a:latin typeface="Times New Roman" panose="02020603050405020304" pitchFamily="18" charset="0"/>
                 <a:cs typeface="Times New Roman" panose="02020603050405020304" pitchFamily="18" charset="0"/>
               </a:rPr>
-              <a:t>IoT</a:t>
+              <a:t>source</a:t>
             </a:r>
             <a:r>
               <a:rPr lang="pt-BR" sz="2000" dirty="0">
@@ -7208,7 +7300,17 @@
                 <a:latin typeface="Times New Roman" panose="02020603050405020304" pitchFamily="18" charset="0"/>
                 <a:cs typeface="Times New Roman" panose="02020603050405020304" pitchFamily="18" charset="0"/>
               </a:rPr>
-              <a:t> - </a:t>
+              <a:t>, biblioteca </a:t>
+            </a:r>
+            <a:r>
+              <a:rPr lang="pt-BR" sz="2000" dirty="0" err="1">
+                <a:solidFill>
+                  <a:schemeClr val="tx1"/>
+                </a:solidFill>
+                <a:latin typeface="Times New Roman" panose="02020603050405020304" pitchFamily="18" charset="0"/>
+                <a:cs typeface="Times New Roman" panose="02020603050405020304" pitchFamily="18" charset="0"/>
+              </a:rPr>
+              <a:t>PyFirmata</a:t>
             </a:r>
             <a:r>
               <a:rPr lang="pt-BR" sz="2000" dirty="0">
@@ -7217,11 +7319,46 @@
                 </a:solidFill>
                 <a:latin typeface="Times New Roman" panose="02020603050405020304" pitchFamily="18" charset="0"/>
                 <a:cs typeface="Times New Roman" panose="02020603050405020304" pitchFamily="18" charset="0"/>
-                <a:hlinkClick r:id="rId3"/>
-              </a:rPr>
-              <a:t>https://www.oracle.com/br/internet-of-things/what-is-iot/</a:t>
-            </a:r>
-            <a:endParaRPr lang="pt-BR" sz="2000" dirty="0">
+              </a:rPr>
+              <a:t>, Placa Arduino UNO</a:t>
+            </a:r>
+          </a:p>
+          <a:p>
+            <a:pPr algn="just">
+              <a:buFont typeface="Wingdings" panose="05000000000000000000" pitchFamily="2" charset="2"/>
+              <a:buChar char="§"/>
+            </a:pPr>
+            <a:r>
+              <a:rPr lang="pt-BR" sz="2000" b="1" dirty="0">
+                <a:solidFill>
+                  <a:schemeClr val="tx1"/>
+                </a:solidFill>
+                <a:latin typeface="Times New Roman" panose="02020603050405020304" pitchFamily="18" charset="0"/>
+                <a:cs typeface="Times New Roman" panose="02020603050405020304" pitchFamily="18" charset="0"/>
+              </a:rPr>
+              <a:t>Plataforma NODEMCU </a:t>
+            </a:r>
+            <a:r>
+              <a:rPr lang="pt-BR" sz="2000" dirty="0">
+                <a:solidFill>
+                  <a:schemeClr val="tx1"/>
+                </a:solidFill>
+                <a:latin typeface="Times New Roman" panose="02020603050405020304" pitchFamily="18" charset="0"/>
+                <a:cs typeface="Times New Roman" panose="02020603050405020304" pitchFamily="18" charset="0"/>
+              </a:rPr>
+              <a:t>e </a:t>
+            </a:r>
+            <a:r>
+              <a:rPr lang="pt-BR" sz="2000" b="1" dirty="0" err="1">
+                <a:solidFill>
+                  <a:schemeClr val="tx1"/>
+                </a:solidFill>
+                <a:latin typeface="Times New Roman" panose="02020603050405020304" pitchFamily="18" charset="0"/>
+                <a:cs typeface="Times New Roman" panose="02020603050405020304" pitchFamily="18" charset="0"/>
+              </a:rPr>
+              <a:t>Micropython</a:t>
+            </a:r>
+            <a:endParaRPr lang="pt-BR" sz="2000" b="1" dirty="0">
               <a:solidFill>
                 <a:schemeClr val="tx1"/>
               </a:solidFill>
@@ -7230,11 +7367,101 @@
             </a:endParaRPr>
           </a:p>
           <a:p>
+            <a:pPr marL="457200" lvl="1" indent="0" algn="just">
+              <a:buNone/>
+            </a:pPr>
+            <a:r>
+              <a:rPr lang="pt-BR" sz="2000" dirty="0">
+                <a:solidFill>
+                  <a:schemeClr val="tx1"/>
+                </a:solidFill>
+                <a:latin typeface="Times New Roman" panose="02020603050405020304" pitchFamily="18" charset="0"/>
+                <a:cs typeface="Times New Roman" panose="02020603050405020304" pitchFamily="18" charset="0"/>
+              </a:rPr>
+              <a:t>Plataforma open </a:t>
+            </a:r>
+            <a:r>
+              <a:rPr lang="pt-BR" sz="2000" dirty="0" err="1">
+                <a:solidFill>
+                  <a:schemeClr val="tx1"/>
+                </a:solidFill>
+                <a:latin typeface="Times New Roman" panose="02020603050405020304" pitchFamily="18" charset="0"/>
+                <a:cs typeface="Times New Roman" panose="02020603050405020304" pitchFamily="18" charset="0"/>
+              </a:rPr>
+              <a:t>source</a:t>
+            </a:r>
+            <a:r>
+              <a:rPr lang="pt-BR" sz="2000" dirty="0">
+                <a:solidFill>
+                  <a:schemeClr val="tx1"/>
+                </a:solidFill>
+                <a:latin typeface="Times New Roman" panose="02020603050405020304" pitchFamily="18" charset="0"/>
+                <a:cs typeface="Times New Roman" panose="02020603050405020304" pitchFamily="18" charset="0"/>
+              </a:rPr>
+              <a:t> da </a:t>
+            </a:r>
+            <a:r>
+              <a:rPr lang="pt-BR" sz="2000" b="1" dirty="0">
+                <a:solidFill>
+                  <a:srgbClr val="FF0000"/>
+                </a:solidFill>
+                <a:latin typeface="Times New Roman" panose="02020603050405020304" pitchFamily="18" charset="0"/>
+                <a:cs typeface="Times New Roman" panose="02020603050405020304" pitchFamily="18" charset="0"/>
+              </a:rPr>
+              <a:t>família ESP8266 e ESP32</a:t>
+            </a:r>
+            <a:r>
+              <a:rPr lang="pt-BR" sz="2000" dirty="0">
+                <a:solidFill>
+                  <a:schemeClr val="tx1"/>
+                </a:solidFill>
+                <a:latin typeface="Times New Roman" panose="02020603050405020304" pitchFamily="18" charset="0"/>
+                <a:cs typeface="Times New Roman" panose="02020603050405020304" pitchFamily="18" charset="0"/>
+              </a:rPr>
+              <a:t> (microcontrolador)</a:t>
+            </a:r>
+          </a:p>
+          <a:p>
             <a:pPr algn="just">
               <a:buFont typeface="Wingdings" panose="05000000000000000000" pitchFamily="2" charset="2"/>
               <a:buChar char="§"/>
             </a:pPr>
             <a:r>
+              <a:rPr lang="pt-BR" sz="2000" b="1" dirty="0">
+                <a:solidFill>
+                  <a:schemeClr val="tx1"/>
+                </a:solidFill>
+                <a:latin typeface="Times New Roman" panose="02020603050405020304" pitchFamily="18" charset="0"/>
+                <a:cs typeface="Times New Roman" panose="02020603050405020304" pitchFamily="18" charset="0"/>
+              </a:rPr>
+              <a:t>Plataforma </a:t>
+            </a:r>
+            <a:r>
+              <a:rPr lang="pt-BR" sz="2000" b="1" dirty="0" err="1">
+                <a:solidFill>
+                  <a:schemeClr val="tx1"/>
+                </a:solidFill>
+                <a:latin typeface="Times New Roman" panose="02020603050405020304" pitchFamily="18" charset="0"/>
+                <a:cs typeface="Times New Roman" panose="02020603050405020304" pitchFamily="18" charset="0"/>
+              </a:rPr>
+              <a:t>Raspberry</a:t>
+            </a:r>
+            <a:r>
+              <a:rPr lang="pt-BR" sz="2000" b="1" dirty="0">
+                <a:solidFill>
+                  <a:schemeClr val="tx1"/>
+                </a:solidFill>
+                <a:latin typeface="Times New Roman" panose="02020603050405020304" pitchFamily="18" charset="0"/>
+                <a:cs typeface="Times New Roman" panose="02020603050405020304" pitchFamily="18" charset="0"/>
+              </a:rPr>
+              <a:t> PI</a:t>
+            </a:r>
+          </a:p>
+          <a:p>
+            <a:pPr marL="457200" lvl="1" indent="0" algn="just">
+              <a:buNone/>
+            </a:pPr>
+            <a:r>
               <a:rPr lang="pt-BR" sz="2000" dirty="0">
                 <a:solidFill>
                   <a:schemeClr val="tx1"/>
@@ -7242,7 +7469,7 @@
                 <a:latin typeface="Times New Roman" panose="02020603050405020304" pitchFamily="18" charset="0"/>
                 <a:cs typeface="Times New Roman" panose="02020603050405020304" pitchFamily="18" charset="0"/>
               </a:rPr>
-              <a:t>Azure </a:t>
+              <a:t>Plataforma open </a:t>
             </a:r>
             <a:r>
               <a:rPr lang="pt-BR" sz="2000" dirty="0" err="1">
@@ -7252,7 +7479,7 @@
                 <a:latin typeface="Times New Roman" panose="02020603050405020304" pitchFamily="18" charset="0"/>
                 <a:cs typeface="Times New Roman" panose="02020603050405020304" pitchFamily="18" charset="0"/>
               </a:rPr>
-              <a:t>IoT</a:t>
+              <a:t>source</a:t>
             </a:r>
             <a:r>
               <a:rPr lang="pt-BR" sz="2000" dirty="0">
@@ -7262,13 +7489,18 @@
                 <a:latin typeface="Times New Roman" panose="02020603050405020304" pitchFamily="18" charset="0"/>
                 <a:cs typeface="Times New Roman" panose="02020603050405020304" pitchFamily="18" charset="0"/>
               </a:rPr>
-              <a:t> - https://azure.microsoft.com/pt-br/solutions/iot/</a:t>
-            </a:r>
-          </a:p>
-          <a:p>
-            <a:pPr marL="0" indent="0" algn="just">
-              <a:buNone/>
-            </a:pPr>
+              <a:t>, biblioteca </a:t>
+            </a:r>
+            <a:r>
+              <a:rPr lang="pt-BR" sz="2000" dirty="0" err="1">
+                <a:solidFill>
+                  <a:schemeClr val="tx1"/>
+                </a:solidFill>
+                <a:latin typeface="Times New Roman" panose="02020603050405020304" pitchFamily="18" charset="0"/>
+                <a:cs typeface="Times New Roman" panose="02020603050405020304" pitchFamily="18" charset="0"/>
+              </a:rPr>
+              <a:t>TensorFlow</a:t>
+            </a:r>
             <a:r>
               <a:rPr lang="pt-BR" sz="2000" dirty="0">
                 <a:solidFill>
@@ -7277,7 +7509,37 @@
                 <a:latin typeface="Times New Roman" panose="02020603050405020304" pitchFamily="18" charset="0"/>
                 <a:cs typeface="Times New Roman" panose="02020603050405020304" pitchFamily="18" charset="0"/>
               </a:rPr>
-              <a:t>     </a:t>
+              <a:t> (</a:t>
+            </a:r>
+            <a:r>
+              <a:rPr lang="pt-BR" sz="2000" b="1" dirty="0" err="1">
+                <a:solidFill>
+                  <a:schemeClr val="tx1"/>
+                </a:solidFill>
+                <a:latin typeface="Times New Roman" panose="02020603050405020304" pitchFamily="18" charset="0"/>
+                <a:cs typeface="Times New Roman" panose="02020603050405020304" pitchFamily="18" charset="0"/>
+              </a:rPr>
+              <a:t>Marchine</a:t>
+            </a:r>
+            <a:r>
+              <a:rPr lang="pt-BR" sz="2000" b="1" dirty="0">
+                <a:solidFill>
+                  <a:schemeClr val="tx1"/>
+                </a:solidFill>
+                <a:latin typeface="Times New Roman" panose="02020603050405020304" pitchFamily="18" charset="0"/>
+                <a:cs typeface="Times New Roman" panose="02020603050405020304" pitchFamily="18" charset="0"/>
+              </a:rPr>
+              <a:t> </a:t>
+            </a:r>
+            <a:r>
+              <a:rPr lang="pt-BR" sz="2000" b="1" dirty="0" err="1">
+                <a:solidFill>
+                  <a:schemeClr val="tx1"/>
+                </a:solidFill>
+                <a:latin typeface="Times New Roman" panose="02020603050405020304" pitchFamily="18" charset="0"/>
+                <a:cs typeface="Times New Roman" panose="02020603050405020304" pitchFamily="18" charset="0"/>
+              </a:rPr>
+              <a:t>learning</a:t>
             </a:r>
             <a:r>
               <a:rPr lang="pt-BR" sz="2000" dirty="0">
@@ -7286,23 +7548,19 @@
                 </a:solidFill>
                 <a:latin typeface="Times New Roman" panose="02020603050405020304" pitchFamily="18" charset="0"/>
                 <a:cs typeface="Times New Roman" panose="02020603050405020304" pitchFamily="18" charset="0"/>
-                <a:hlinkClick r:id="rId4"/>
-              </a:rPr>
-              <a:t>https://azure.microsoft.com/pt-br/solutions/iot/#overview</a:t>
-            </a:r>
-            <a:endParaRPr lang="pt-BR" sz="2000" dirty="0">
-              <a:solidFill>
-                <a:schemeClr val="tx1"/>
-              </a:solidFill>
-              <a:latin typeface="Times New Roman" panose="02020603050405020304" pitchFamily="18" charset="0"/>
-              <a:cs typeface="Times New Roman" panose="02020603050405020304" pitchFamily="18" charset="0"/>
-            </a:endParaRPr>
-          </a:p>
-          <a:p>
-            <a:pPr algn="just">
-              <a:buFont typeface="Wingdings" panose="05000000000000000000" pitchFamily="2" charset="2"/>
-              <a:buChar char="§"/>
-            </a:pPr>
+              </a:rPr>
+              <a:t>), sensores e atuadores (</a:t>
+            </a:r>
+            <a:r>
+              <a:rPr lang="pt-BR" sz="2000" b="1" dirty="0">
+                <a:solidFill>
+                  <a:schemeClr val="tx1"/>
+                </a:solidFill>
+                <a:latin typeface="Times New Roman" panose="02020603050405020304" pitchFamily="18" charset="0"/>
+                <a:cs typeface="Times New Roman" panose="02020603050405020304" pitchFamily="18" charset="0"/>
+              </a:rPr>
+              <a:t>dispositivos</a:t>
+            </a:r>
             <a:r>
               <a:rPr lang="pt-BR" sz="2000" dirty="0">
                 <a:solidFill>
@@ -7311,17 +7569,17 @@
                 <a:latin typeface="Times New Roman" panose="02020603050405020304" pitchFamily="18" charset="0"/>
                 <a:cs typeface="Times New Roman" panose="02020603050405020304" pitchFamily="18" charset="0"/>
               </a:rPr>
-              <a:t>Google Cloud </a:t>
-            </a:r>
-            <a:r>
-              <a:rPr lang="pt-BR" sz="2000" dirty="0" err="1">
-                <a:solidFill>
-                  <a:schemeClr val="tx1"/>
-                </a:solidFill>
-                <a:latin typeface="Times New Roman" panose="02020603050405020304" pitchFamily="18" charset="0"/>
-                <a:cs typeface="Times New Roman" panose="02020603050405020304" pitchFamily="18" charset="0"/>
-              </a:rPr>
-              <a:t>IoT</a:t>
+              <a:t>: para gerar movimento, </a:t>
+            </a:r>
+            <a:r>
+              <a:rPr lang="pt-BR" sz="2000">
+                <a:solidFill>
+                  <a:schemeClr val="tx1"/>
+                </a:solidFill>
+                <a:latin typeface="Times New Roman" panose="02020603050405020304" pitchFamily="18" charset="0"/>
+                <a:cs typeface="Times New Roman" panose="02020603050405020304" pitchFamily="18" charset="0"/>
+              </a:rPr>
+              <a:t>energia mecânica.) </a:t>
             </a:r>
             <a:r>
               <a:rPr lang="pt-BR" sz="2000" dirty="0">
@@ -7331,156 +7589,8 @@
                 <a:latin typeface="Times New Roman" panose="02020603050405020304" pitchFamily="18" charset="0"/>
                 <a:cs typeface="Times New Roman" panose="02020603050405020304" pitchFamily="18" charset="0"/>
               </a:rPr>
-              <a:t> Platform</a:t>
-            </a:r>
-          </a:p>
-          <a:p>
-            <a:pPr algn="just">
-              <a:buFont typeface="Wingdings" panose="05000000000000000000" pitchFamily="2" charset="2"/>
-              <a:buChar char="§"/>
-            </a:pPr>
-            <a:r>
-              <a:rPr lang="pt-BR" sz="2000" dirty="0">
-                <a:solidFill>
-                  <a:schemeClr val="tx1"/>
-                </a:solidFill>
-                <a:latin typeface="Times New Roman" panose="02020603050405020304" pitchFamily="18" charset="0"/>
-                <a:cs typeface="Times New Roman" panose="02020603050405020304" pitchFamily="18" charset="0"/>
-              </a:rPr>
-              <a:t>Plataforma de serviços da Web da </a:t>
-            </a:r>
-            <a:r>
-              <a:rPr lang="pt-BR" sz="2000" dirty="0" err="1">
-                <a:solidFill>
-                  <a:schemeClr val="tx1"/>
-                </a:solidFill>
-                <a:latin typeface="Times New Roman" panose="02020603050405020304" pitchFamily="18" charset="0"/>
-                <a:cs typeface="Times New Roman" panose="02020603050405020304" pitchFamily="18" charset="0"/>
-              </a:rPr>
-              <a:t>Amazon</a:t>
-            </a:r>
-            <a:r>
-              <a:rPr lang="pt-BR" sz="2000" dirty="0">
-                <a:solidFill>
-                  <a:schemeClr val="tx1"/>
-                </a:solidFill>
-                <a:latin typeface="Times New Roman" panose="02020603050405020304" pitchFamily="18" charset="0"/>
-                <a:cs typeface="Times New Roman" panose="02020603050405020304" pitchFamily="18" charset="0"/>
-              </a:rPr>
-              <a:t> para </a:t>
-            </a:r>
-            <a:r>
-              <a:rPr lang="pt-BR" sz="2000" dirty="0" err="1">
-                <a:solidFill>
-                  <a:schemeClr val="tx1"/>
-                </a:solidFill>
-                <a:latin typeface="Times New Roman" panose="02020603050405020304" pitchFamily="18" charset="0"/>
-                <a:cs typeface="Times New Roman" panose="02020603050405020304" pitchFamily="18" charset="0"/>
-              </a:rPr>
-              <a:t>IoT</a:t>
-            </a:r>
-            <a:endParaRPr lang="pt-BR" sz="2000" dirty="0">
-              <a:solidFill>
-                <a:schemeClr val="tx1"/>
-              </a:solidFill>
-              <a:latin typeface="Times New Roman" panose="02020603050405020304" pitchFamily="18" charset="0"/>
-              <a:cs typeface="Times New Roman" panose="02020603050405020304" pitchFamily="18" charset="0"/>
-            </a:endParaRPr>
-          </a:p>
-          <a:p>
-            <a:pPr algn="just">
-              <a:buFont typeface="Wingdings" panose="05000000000000000000" pitchFamily="2" charset="2"/>
-              <a:buChar char="§"/>
-            </a:pPr>
-            <a:r>
-              <a:rPr lang="pt-BR" sz="2000" dirty="0" err="1">
-                <a:solidFill>
-                  <a:schemeClr val="tx1"/>
-                </a:solidFill>
-                <a:latin typeface="Times New Roman" panose="02020603050405020304" pitchFamily="18" charset="0"/>
-                <a:cs typeface="Times New Roman" panose="02020603050405020304" pitchFamily="18" charset="0"/>
-              </a:rPr>
-              <a:t>ThingWorx</a:t>
-            </a:r>
-            <a:endParaRPr lang="pt-BR" sz="2000" dirty="0">
-              <a:solidFill>
-                <a:schemeClr val="tx1"/>
-              </a:solidFill>
-              <a:latin typeface="Times New Roman" panose="02020603050405020304" pitchFamily="18" charset="0"/>
-              <a:cs typeface="Times New Roman" panose="02020603050405020304" pitchFamily="18" charset="0"/>
-            </a:endParaRPr>
-          </a:p>
-          <a:p>
-            <a:pPr algn="just">
-              <a:buFont typeface="Wingdings" panose="05000000000000000000" pitchFamily="2" charset="2"/>
-              <a:buChar char="§"/>
-            </a:pPr>
-            <a:r>
-              <a:rPr lang="pt-BR" sz="2000" dirty="0">
-                <a:solidFill>
-                  <a:schemeClr val="tx1"/>
-                </a:solidFill>
-                <a:latin typeface="Times New Roman" panose="02020603050405020304" pitchFamily="18" charset="0"/>
-                <a:cs typeface="Times New Roman" panose="02020603050405020304" pitchFamily="18" charset="0"/>
-              </a:rPr>
-              <a:t>IRI Voracidade </a:t>
-            </a:r>
-          </a:p>
-          <a:p>
-            <a:pPr algn="just">
-              <a:buFont typeface="Wingdings" panose="05000000000000000000" pitchFamily="2" charset="2"/>
-              <a:buChar char="§"/>
-            </a:pPr>
-            <a:r>
-              <a:rPr lang="pt-BR" sz="2000" dirty="0">
-                <a:solidFill>
-                  <a:schemeClr val="tx1"/>
-                </a:solidFill>
-                <a:latin typeface="Times New Roman" panose="02020603050405020304" pitchFamily="18" charset="0"/>
-                <a:cs typeface="Times New Roman" panose="02020603050405020304" pitchFamily="18" charset="0"/>
-              </a:rPr>
-              <a:t>IBM Watson </a:t>
-            </a:r>
-            <a:r>
-              <a:rPr lang="pt-BR" sz="2000" dirty="0" err="1">
-                <a:solidFill>
-                  <a:schemeClr val="tx1"/>
-                </a:solidFill>
-                <a:latin typeface="Times New Roman" panose="02020603050405020304" pitchFamily="18" charset="0"/>
-                <a:cs typeface="Times New Roman" panose="02020603050405020304" pitchFamily="18" charset="0"/>
-              </a:rPr>
-              <a:t>IoT</a:t>
-            </a:r>
-            <a:endParaRPr lang="pt-BR" sz="2000" dirty="0">
-              <a:solidFill>
-                <a:schemeClr val="tx1"/>
-              </a:solidFill>
-              <a:latin typeface="Times New Roman" panose="02020603050405020304" pitchFamily="18" charset="0"/>
-              <a:cs typeface="Times New Roman" panose="02020603050405020304" pitchFamily="18" charset="0"/>
-            </a:endParaRPr>
-          </a:p>
-          <a:p>
-            <a:pPr marL="0" indent="0" algn="just">
-              <a:buNone/>
-            </a:pPr>
-            <a:r>
-              <a:rPr lang="pt-BR" sz="2000" dirty="0">
-                <a:solidFill>
-                  <a:schemeClr val="tx1"/>
-                </a:solidFill>
-                <a:latin typeface="Times New Roman" panose="02020603050405020304" pitchFamily="18" charset="0"/>
-                <a:cs typeface="Times New Roman" panose="02020603050405020304" pitchFamily="18" charset="0"/>
-                <a:hlinkClick r:id="rId5"/>
-              </a:rPr>
-              <a:t>https://acervolima.com/7-melhores-plataformas-de-desenvolvimento-de-internet-das-coisas-iot/</a:t>
-            </a:r>
-            <a:endParaRPr lang="pt-BR" sz="2000" dirty="0">
-              <a:solidFill>
-                <a:schemeClr val="tx1"/>
-              </a:solidFill>
-              <a:latin typeface="Times New Roman" panose="02020603050405020304" pitchFamily="18" charset="0"/>
-              <a:cs typeface="Times New Roman" panose="02020603050405020304" pitchFamily="18" charset="0"/>
-            </a:endParaRPr>
+              <a:t>.</a:t>
+            </a:r>
           </a:p>
         </p:txBody>
       </p:sp>
@@ -7538,28 +7648,20 @@
           <a:lstStyle/>
           <a:p>
             <a:r>
-              <a:rPr lang="en-US" b="1" dirty="0" err="1">
+              <a:rPr lang="pt-BR" b="1" dirty="0">
                 <a:solidFill>
                   <a:srgbClr val="0070C0"/>
                 </a:solidFill>
               </a:rPr>
-              <a:t>Leitura</a:t>
-            </a:r>
-            <a:r>
-              <a:rPr lang="en-US" b="1" dirty="0">
+              <a:t>Plataformas </a:t>
+            </a:r>
+            <a:r>
+              <a:rPr lang="pt-BR" b="1" dirty="0" err="1">
                 <a:solidFill>
                   <a:srgbClr val="0070C0"/>
                 </a:solidFill>
               </a:rPr>
-              <a:t> </a:t>
-            </a:r>
-            <a:r>
-              <a:rPr lang="en-US" b="1" dirty="0" err="1">
-                <a:solidFill>
-                  <a:srgbClr val="0070C0"/>
-                </a:solidFill>
-              </a:rPr>
-              <a:t>Específica</a:t>
+              <a:t>IoT</a:t>
             </a:r>
             <a:endParaRPr lang="en-US" b="1" dirty="0">
               <a:solidFill>
@@ -7581,8 +7683,8 @@
         </p:nvSpPr>
         <p:spPr>
           <a:xfrm>
-            <a:off x="142865" y="968502"/>
-            <a:ext cx="8865056" cy="3810761"/>
+            <a:off x="142865" y="1200150"/>
+            <a:ext cx="8865056" cy="3737370"/>
           </a:xfrm>
         </p:spPr>
         <p:txBody>
@@ -7591,122 +7693,285 @@
           </a:bodyPr>
           <a:lstStyle/>
           <a:p>
-            <a:pPr marL="0" indent="0" algn="just">
-              <a:buNone/>
+            <a:pPr algn="just">
+              <a:buFont typeface="Wingdings" panose="05000000000000000000" pitchFamily="2" charset="2"/>
+              <a:buChar char="§"/>
             </a:pPr>
             <a:r>
               <a:rPr lang="pt-BR" sz="2000" dirty="0">
-                <a:latin typeface="Times New Roman" panose="02020603050405020304" pitchFamily="18" charset="0"/>
-                <a:cs typeface="Times New Roman" panose="02020603050405020304" pitchFamily="18" charset="0"/>
-              </a:rPr>
-              <a:t>[1] </a:t>
+                <a:solidFill>
+                  <a:schemeClr val="tx1"/>
+                </a:solidFill>
+                <a:latin typeface="Times New Roman" panose="02020603050405020304" pitchFamily="18" charset="0"/>
+                <a:cs typeface="Times New Roman" panose="02020603050405020304" pitchFamily="18" charset="0"/>
+              </a:rPr>
+              <a:t>Oracle </a:t>
             </a:r>
             <a:r>
               <a:rPr lang="pt-BR" sz="2000" dirty="0" err="1">
+                <a:solidFill>
+                  <a:schemeClr val="tx1"/>
+                </a:solidFill>
                 <a:latin typeface="Times New Roman" panose="02020603050405020304" pitchFamily="18" charset="0"/>
                 <a:cs typeface="Times New Roman" panose="02020603050405020304" pitchFamily="18" charset="0"/>
               </a:rPr>
               <a:t>IoT</a:t>
             </a:r>
+            <a:r>
+              <a:rPr lang="pt-BR" sz="2000" dirty="0">
+                <a:solidFill>
+                  <a:schemeClr val="tx1"/>
+                </a:solidFill>
+                <a:latin typeface="Times New Roman" panose="02020603050405020304" pitchFamily="18" charset="0"/>
+                <a:cs typeface="Times New Roman" panose="02020603050405020304" pitchFamily="18" charset="0"/>
+              </a:rPr>
+              <a:t> - </a:t>
+            </a:r>
+            <a:r>
+              <a:rPr lang="pt-BR" sz="2000" dirty="0">
+                <a:solidFill>
+                  <a:schemeClr val="tx1"/>
+                </a:solidFill>
+                <a:latin typeface="Times New Roman" panose="02020603050405020304" pitchFamily="18" charset="0"/>
+                <a:cs typeface="Times New Roman" panose="02020603050405020304" pitchFamily="18" charset="0"/>
+                <a:hlinkClick r:id="rId3"/>
+              </a:rPr>
+              <a:t>https://www.oracle.com/br/internet-of-things/what-is-iot/</a:t>
+            </a:r>
             <a:endParaRPr lang="pt-BR" sz="2000" dirty="0">
+              <a:solidFill>
+                <a:schemeClr val="tx1"/>
+              </a:solidFill>
               <a:latin typeface="Times New Roman" panose="02020603050405020304" pitchFamily="18" charset="0"/>
               <a:cs typeface="Times New Roman" panose="02020603050405020304" pitchFamily="18" charset="0"/>
             </a:endParaRPr>
           </a:p>
           <a:p>
+            <a:pPr algn="just">
+              <a:buFont typeface="Wingdings" panose="05000000000000000000" pitchFamily="2" charset="2"/>
+              <a:buChar char="§"/>
+            </a:pPr>
+            <a:r>
+              <a:rPr lang="pt-BR" sz="2000" dirty="0">
+                <a:solidFill>
+                  <a:schemeClr val="tx1"/>
+                </a:solidFill>
+                <a:latin typeface="Times New Roman" panose="02020603050405020304" pitchFamily="18" charset="0"/>
+                <a:cs typeface="Times New Roman" panose="02020603050405020304" pitchFamily="18" charset="0"/>
+              </a:rPr>
+              <a:t>Azure </a:t>
+            </a:r>
+            <a:r>
+              <a:rPr lang="pt-BR" sz="2000" dirty="0" err="1">
+                <a:solidFill>
+                  <a:schemeClr val="tx1"/>
+                </a:solidFill>
+                <a:latin typeface="Times New Roman" panose="02020603050405020304" pitchFamily="18" charset="0"/>
+                <a:cs typeface="Times New Roman" panose="02020603050405020304" pitchFamily="18" charset="0"/>
+              </a:rPr>
+              <a:t>IoT</a:t>
+            </a:r>
+            <a:r>
+              <a:rPr lang="pt-BR" sz="2000" dirty="0">
+                <a:solidFill>
+                  <a:schemeClr val="tx1"/>
+                </a:solidFill>
+                <a:latin typeface="Times New Roman" panose="02020603050405020304" pitchFamily="18" charset="0"/>
+                <a:cs typeface="Times New Roman" panose="02020603050405020304" pitchFamily="18" charset="0"/>
+              </a:rPr>
+              <a:t> - https://azure.microsoft.com/pt-br/solutions/iot/</a:t>
+            </a:r>
+          </a:p>
+          <a:p>
             <a:pPr marL="0" indent="0" algn="just">
               <a:buNone/>
             </a:pPr>
             <a:r>
-              <a:rPr lang="pt-BR" sz="2000" b="1" dirty="0">
-                <a:solidFill>
-                  <a:srgbClr val="FF0000"/>
-                </a:solidFill>
-                <a:latin typeface="Times New Roman" panose="02020603050405020304" pitchFamily="18" charset="0"/>
-                <a:cs typeface="Times New Roman" panose="02020603050405020304" pitchFamily="18" charset="0"/>
-              </a:rPr>
-              <a:t>Disponível em: </a:t>
-            </a:r>
-            <a:r>
               <a:rPr lang="pt-BR" sz="2000" dirty="0">
-                <a:latin typeface="Times New Roman" panose="02020603050405020304" pitchFamily="18" charset="0"/>
-                <a:cs typeface="Times New Roman" panose="02020603050405020304" pitchFamily="18" charset="0"/>
-                <a:hlinkClick r:id="rId3"/>
-              </a:rPr>
-              <a:t>https://azure.microsoft.com/pt-br/resources/cloud-computing-dictionary/what-is-iot/</a:t>
+                <a:solidFill>
+                  <a:schemeClr val="tx1"/>
+                </a:solidFill>
+                <a:latin typeface="Times New Roman" panose="02020603050405020304" pitchFamily="18" charset="0"/>
+                <a:cs typeface="Times New Roman" panose="02020603050405020304" pitchFamily="18" charset="0"/>
+              </a:rPr>
+              <a:t>     </a:t>
+            </a:r>
+            <a:r>
+              <a:rPr lang="pt-BR" sz="2000" dirty="0">
+                <a:solidFill>
+                  <a:schemeClr val="tx1"/>
+                </a:solidFill>
+                <a:latin typeface="Times New Roman" panose="02020603050405020304" pitchFamily="18" charset="0"/>
+                <a:cs typeface="Times New Roman" panose="02020603050405020304" pitchFamily="18" charset="0"/>
+                <a:hlinkClick r:id="rId4"/>
+              </a:rPr>
+              <a:t>https://azure.microsoft.com/pt-br/solutions/iot/#overview</a:t>
             </a:r>
             <a:endParaRPr lang="pt-BR" sz="2000" dirty="0">
+              <a:solidFill>
+                <a:schemeClr val="tx1"/>
+              </a:solidFill>
               <a:latin typeface="Times New Roman" panose="02020603050405020304" pitchFamily="18" charset="0"/>
               <a:cs typeface="Times New Roman" panose="02020603050405020304" pitchFamily="18" charset="0"/>
             </a:endParaRPr>
           </a:p>
           <a:p>
-            <a:pPr marL="0" indent="0" algn="just">
-              <a:buNone/>
+            <a:pPr algn="just">
+              <a:buFont typeface="Wingdings" panose="05000000000000000000" pitchFamily="2" charset="2"/>
+              <a:buChar char="§"/>
             </a:pPr>
+            <a:r>
+              <a:rPr lang="pt-BR" sz="2000" dirty="0">
+                <a:solidFill>
+                  <a:schemeClr val="tx1"/>
+                </a:solidFill>
+                <a:latin typeface="Times New Roman" panose="02020603050405020304" pitchFamily="18" charset="0"/>
+                <a:cs typeface="Times New Roman" panose="02020603050405020304" pitchFamily="18" charset="0"/>
+              </a:rPr>
+              <a:t>Google Cloud </a:t>
+            </a:r>
+            <a:r>
+              <a:rPr lang="pt-BR" sz="2000" dirty="0" err="1">
+                <a:solidFill>
+                  <a:schemeClr val="tx1"/>
+                </a:solidFill>
+                <a:latin typeface="Times New Roman" panose="02020603050405020304" pitchFamily="18" charset="0"/>
+                <a:cs typeface="Times New Roman" panose="02020603050405020304" pitchFamily="18" charset="0"/>
+              </a:rPr>
+              <a:t>IoT</a:t>
+            </a:r>
+            <a:r>
+              <a:rPr lang="pt-BR" sz="2000" dirty="0">
+                <a:solidFill>
+                  <a:schemeClr val="tx1"/>
+                </a:solidFill>
+                <a:latin typeface="Times New Roman" panose="02020603050405020304" pitchFamily="18" charset="0"/>
+                <a:cs typeface="Times New Roman" panose="02020603050405020304" pitchFamily="18" charset="0"/>
+              </a:rPr>
+              <a:t> Platform</a:t>
+            </a:r>
+          </a:p>
+          <a:p>
+            <a:pPr algn="just">
+              <a:buFont typeface="Wingdings" panose="05000000000000000000" pitchFamily="2" charset="2"/>
+              <a:buChar char="§"/>
+            </a:pPr>
+            <a:r>
+              <a:rPr lang="pt-BR" sz="2000" dirty="0">
+                <a:solidFill>
+                  <a:schemeClr val="tx1"/>
+                </a:solidFill>
+                <a:latin typeface="Times New Roman" panose="02020603050405020304" pitchFamily="18" charset="0"/>
+                <a:cs typeface="Times New Roman" panose="02020603050405020304" pitchFamily="18" charset="0"/>
+              </a:rPr>
+              <a:t>Plataforma de serviços da Web da </a:t>
+            </a:r>
+            <a:r>
+              <a:rPr lang="pt-BR" sz="2000" dirty="0" err="1">
+                <a:solidFill>
+                  <a:schemeClr val="tx1"/>
+                </a:solidFill>
+                <a:latin typeface="Times New Roman" panose="02020603050405020304" pitchFamily="18" charset="0"/>
+                <a:cs typeface="Times New Roman" panose="02020603050405020304" pitchFamily="18" charset="0"/>
+              </a:rPr>
+              <a:t>Amazon</a:t>
+            </a:r>
+            <a:r>
+              <a:rPr lang="pt-BR" sz="2000" dirty="0">
+                <a:solidFill>
+                  <a:schemeClr val="tx1"/>
+                </a:solidFill>
+                <a:latin typeface="Times New Roman" panose="02020603050405020304" pitchFamily="18" charset="0"/>
+                <a:cs typeface="Times New Roman" panose="02020603050405020304" pitchFamily="18" charset="0"/>
+              </a:rPr>
+              <a:t> para </a:t>
+            </a:r>
+            <a:r>
+              <a:rPr lang="pt-BR" sz="2000" dirty="0" err="1">
+                <a:solidFill>
+                  <a:schemeClr val="tx1"/>
+                </a:solidFill>
+                <a:latin typeface="Times New Roman" panose="02020603050405020304" pitchFamily="18" charset="0"/>
+                <a:cs typeface="Times New Roman" panose="02020603050405020304" pitchFamily="18" charset="0"/>
+              </a:rPr>
+              <a:t>IoT</a:t>
+            </a:r>
             <a:endParaRPr lang="pt-BR" sz="2000" dirty="0">
+              <a:solidFill>
+                <a:schemeClr val="tx1"/>
+              </a:solidFill>
               <a:latin typeface="Times New Roman" panose="02020603050405020304" pitchFamily="18" charset="0"/>
               <a:cs typeface="Times New Roman" panose="02020603050405020304" pitchFamily="18" charset="0"/>
             </a:endParaRPr>
           </a:p>
           <a:p>
-            <a:pPr marL="0" indent="0" algn="just">
-              <a:buNone/>
+            <a:pPr algn="just">
+              <a:buFont typeface="Wingdings" panose="05000000000000000000" pitchFamily="2" charset="2"/>
+              <a:buChar char="§"/>
             </a:pPr>
             <a:r>
-              <a:rPr lang="pt-BR" sz="2000" dirty="0">
-                <a:latin typeface="Times New Roman" panose="02020603050405020304" pitchFamily="18" charset="0"/>
-                <a:cs typeface="Times New Roman" panose="02020603050405020304" pitchFamily="18" charset="0"/>
-              </a:rPr>
-              <a:t>[2] </a:t>
-            </a:r>
-            <a:r>
               <a:rPr lang="pt-BR" sz="2000" dirty="0" err="1">
-                <a:latin typeface="Times New Roman" panose="02020603050405020304" pitchFamily="18" charset="0"/>
-                <a:cs typeface="Times New Roman" panose="02020603050405020304" pitchFamily="18" charset="0"/>
-              </a:rPr>
-              <a:t>IoT</a:t>
-            </a:r>
-            <a:r>
-              <a:rPr lang="pt-BR" sz="2000" dirty="0">
-                <a:latin typeface="Times New Roman" panose="02020603050405020304" pitchFamily="18" charset="0"/>
-                <a:cs typeface="Times New Roman" panose="02020603050405020304" pitchFamily="18" charset="0"/>
-              </a:rPr>
-              <a:t> </a:t>
-            </a:r>
-          </a:p>
-          <a:p>
-            <a:pPr marL="0" indent="0" algn="just">
-              <a:buNone/>
-            </a:pPr>
-            <a:r>
-              <a:rPr lang="pt-BR" sz="2000" b="1" dirty="0">
-                <a:solidFill>
-                  <a:srgbClr val="FF0000"/>
-                </a:solidFill>
-                <a:latin typeface="Times New Roman" panose="02020603050405020304" pitchFamily="18" charset="0"/>
-                <a:cs typeface="Times New Roman" panose="02020603050405020304" pitchFamily="18" charset="0"/>
-              </a:rPr>
-              <a:t>Disponível em: </a:t>
-            </a:r>
-            <a:r>
-              <a:rPr lang="pt-BR" sz="2000" dirty="0">
-                <a:latin typeface="Times New Roman" panose="02020603050405020304" pitchFamily="18" charset="0"/>
-                <a:cs typeface="Times New Roman" panose="02020603050405020304" pitchFamily="18" charset="0"/>
-                <a:hlinkClick r:id="rId4"/>
-              </a:rPr>
-              <a:t>https://www.sap.com/brazil/insights/what-is-iot-internet-of-things.html</a:t>
+                <a:solidFill>
+                  <a:schemeClr val="tx1"/>
+                </a:solidFill>
+                <a:latin typeface="Times New Roman" panose="02020603050405020304" pitchFamily="18" charset="0"/>
+                <a:cs typeface="Times New Roman" panose="02020603050405020304" pitchFamily="18" charset="0"/>
+              </a:rPr>
+              <a:t>ThingWorx</a:t>
             </a:r>
             <a:endParaRPr lang="pt-BR" sz="2000" dirty="0">
+              <a:solidFill>
+                <a:schemeClr val="tx1"/>
+              </a:solidFill>
               <a:latin typeface="Times New Roman" panose="02020603050405020304" pitchFamily="18" charset="0"/>
               <a:cs typeface="Times New Roman" panose="02020603050405020304" pitchFamily="18" charset="0"/>
             </a:endParaRPr>
           </a:p>
           <a:p>
-            <a:pPr marL="0" indent="0" algn="just">
-              <a:buNone/>
+            <a:pPr algn="just">
+              <a:buFont typeface="Wingdings" panose="05000000000000000000" pitchFamily="2" charset="2"/>
+              <a:buChar char="§"/>
             </a:pPr>
+            <a:r>
+              <a:rPr lang="pt-BR" sz="2000" dirty="0">
+                <a:solidFill>
+                  <a:schemeClr val="tx1"/>
+                </a:solidFill>
+                <a:latin typeface="Times New Roman" panose="02020603050405020304" pitchFamily="18" charset="0"/>
+                <a:cs typeface="Times New Roman" panose="02020603050405020304" pitchFamily="18" charset="0"/>
+              </a:rPr>
+              <a:t>IRI Voracidade </a:t>
+            </a:r>
+          </a:p>
+          <a:p>
+            <a:pPr algn="just">
+              <a:buFont typeface="Wingdings" panose="05000000000000000000" pitchFamily="2" charset="2"/>
+              <a:buChar char="§"/>
+            </a:pPr>
+            <a:r>
+              <a:rPr lang="pt-BR" sz="2000" dirty="0">
+                <a:solidFill>
+                  <a:schemeClr val="tx1"/>
+                </a:solidFill>
+                <a:latin typeface="Times New Roman" panose="02020603050405020304" pitchFamily="18" charset="0"/>
+                <a:cs typeface="Times New Roman" panose="02020603050405020304" pitchFamily="18" charset="0"/>
+              </a:rPr>
+              <a:t>IBM Watson </a:t>
+            </a:r>
+            <a:r>
+              <a:rPr lang="pt-BR" sz="2000" dirty="0" err="1">
+                <a:solidFill>
+                  <a:schemeClr val="tx1"/>
+                </a:solidFill>
+                <a:latin typeface="Times New Roman" panose="02020603050405020304" pitchFamily="18" charset="0"/>
+                <a:cs typeface="Times New Roman" panose="02020603050405020304" pitchFamily="18" charset="0"/>
+              </a:rPr>
+              <a:t>IoT</a:t>
+            </a:r>
             <a:endParaRPr lang="pt-BR" sz="2000" dirty="0">
+              <a:solidFill>
+                <a:schemeClr val="tx1"/>
+              </a:solidFill>
               <a:latin typeface="Times New Roman" panose="02020603050405020304" pitchFamily="18" charset="0"/>
               <a:cs typeface="Times New Roman" panose="02020603050405020304" pitchFamily="18" charset="0"/>
             </a:endParaRPr>
@@ -7717,68 +7982,21 @@
             </a:pPr>
             <a:r>
               <a:rPr lang="pt-BR" sz="2000" dirty="0">
-                <a:latin typeface="Times New Roman" panose="02020603050405020304" pitchFamily="18" charset="0"/>
-                <a:cs typeface="Times New Roman" panose="02020603050405020304" pitchFamily="18" charset="0"/>
-              </a:rPr>
-              <a:t>[3] </a:t>
-            </a:r>
-            <a:r>
-              <a:rPr lang="pt-BR" sz="2000" dirty="0" err="1">
-                <a:latin typeface="Times New Roman" panose="02020603050405020304" pitchFamily="18" charset="0"/>
-                <a:cs typeface="Times New Roman" panose="02020603050405020304" pitchFamily="18" charset="0"/>
-              </a:rPr>
-              <a:t>IoT</a:t>
-            </a:r>
-            <a:r>
-              <a:rPr lang="pt-BR" sz="2000" dirty="0">
-                <a:latin typeface="Times New Roman" panose="02020603050405020304" pitchFamily="18" charset="0"/>
-                <a:cs typeface="Times New Roman" panose="02020603050405020304" pitchFamily="18" charset="0"/>
-              </a:rPr>
-              <a:t> </a:t>
-            </a:r>
-          </a:p>
-          <a:p>
-            <a:pPr marL="0" indent="0" algn="just">
-              <a:buNone/>
-            </a:pPr>
-            <a:r>
-              <a:rPr lang="pt-BR" sz="2000" b="1" dirty="0">
-                <a:solidFill>
-                  <a:srgbClr val="FF0000"/>
-                </a:solidFill>
-                <a:latin typeface="Times New Roman" panose="02020603050405020304" pitchFamily="18" charset="0"/>
-                <a:cs typeface="Times New Roman" panose="02020603050405020304" pitchFamily="18" charset="0"/>
-              </a:rPr>
-              <a:t>Disponível em: </a:t>
-            </a:r>
-            <a:r>
-              <a:rPr lang="pt-BR" sz="2000" dirty="0">
+                <a:solidFill>
+                  <a:schemeClr val="tx1"/>
+                </a:solidFill>
                 <a:latin typeface="Times New Roman" panose="02020603050405020304" pitchFamily="18" charset="0"/>
                 <a:cs typeface="Times New Roman" panose="02020603050405020304" pitchFamily="18" charset="0"/>
                 <a:hlinkClick r:id="rId5"/>
               </a:rPr>
-              <a:t>https://tecnoblog.net/responde/o-que-e-internet-das-coisas/</a:t>
+              <a:t>https://acervolima.com/7-melhores-plataformas-de-desenvolvimento-de-internet-das-coisas-iot/</a:t>
             </a:r>
             <a:endParaRPr lang="pt-BR" sz="2000" dirty="0">
+              <a:solidFill>
+                <a:schemeClr val="tx1"/>
+              </a:solidFill>
               <a:latin typeface="Times New Roman" panose="02020603050405020304" pitchFamily="18" charset="0"/>
               <a:cs typeface="Times New Roman" panose="02020603050405020304" pitchFamily="18" charset="0"/>
-            </a:endParaRPr>
-          </a:p>
-          <a:p>
-            <a:pPr marL="0" indent="0" algn="just">
-              <a:buNone/>
-            </a:pPr>
-            <a:endParaRPr lang="pt-BR" sz="2000" dirty="0">
-              <a:latin typeface="Times New Roman" panose="02020603050405020304" pitchFamily="18" charset="0"/>
-              <a:cs typeface="Times New Roman" panose="02020603050405020304" pitchFamily="18" charset="0"/>
-            </a:endParaRPr>
-          </a:p>
-          <a:p>
-            <a:pPr marL="0" indent="0" algn="just">
-              <a:buNone/>
-            </a:pPr>
-            <a:endParaRPr lang="pt-BR" sz="2000" dirty="0">
-              <a:latin typeface="Calibri" panose="020F0502020204030204" pitchFamily="34" charset="0"/>
             </a:endParaRPr>
           </a:p>
         </p:txBody>
@@ -7786,7 +8004,7 @@
     </p:spTree>
     <p:extLst>
       <p:ext uri="{BB962C8B-B14F-4D97-AF65-F5344CB8AC3E}">
-        <p14:creationId xmlns:p14="http://schemas.microsoft.com/office/powerpoint/2010/main" val="3680270425"/>
+        <p14:creationId xmlns:p14="http://schemas.microsoft.com/office/powerpoint/2010/main" val="611786249"/>
       </p:ext>
     </p:extLst>
   </p:cSld>
@@ -8341,7 +8559,7 @@
                   <a:srgbClr val="0070C0"/>
                 </a:solidFill>
               </a:rPr>
-              <a:t>Aprenda</a:t>
+              <a:t>Leitura</a:t>
             </a:r>
             <a:r>
               <a:rPr lang="en-US" b="1" dirty="0">
@@ -8349,8 +8567,21 @@
                   <a:srgbClr val="0070C0"/>
                 </a:solidFill>
               </a:rPr>
-              <a:t>+</a:t>
-            </a:r>
+              <a:t> </a:t>
+            </a:r>
+            <a:r>
+              <a:rPr lang="en-US" b="1" dirty="0" err="1">
+                <a:solidFill>
+                  <a:srgbClr val="0070C0"/>
+                </a:solidFill>
+              </a:rPr>
+              <a:t>Específica</a:t>
+            </a:r>
+            <a:endParaRPr lang="en-US" b="1" dirty="0">
+              <a:solidFill>
+                <a:srgbClr val="0070C0"/>
+              </a:solidFill>
+            </a:endParaRPr>
           </a:p>
         </p:txBody>
       </p:sp>
@@ -8366,8 +8597,8 @@
         </p:nvSpPr>
         <p:spPr>
           <a:xfrm>
-            <a:off x="142865" y="1200150"/>
-            <a:ext cx="8865056" cy="3737370"/>
+            <a:off x="142865" y="968502"/>
+            <a:ext cx="8865056" cy="3810761"/>
           </a:xfrm>
         </p:spPr>
         <p:txBody>
@@ -8380,20 +8611,20 @@
               <a:buNone/>
             </a:pPr>
             <a:r>
-              <a:rPr lang="pt-BR" sz="2400" dirty="0">
+              <a:rPr lang="pt-BR" sz="2000" dirty="0">
                 <a:latin typeface="Times New Roman" panose="02020603050405020304" pitchFamily="18" charset="0"/>
                 <a:cs typeface="Times New Roman" panose="02020603050405020304" pitchFamily="18" charset="0"/>
               </a:rPr>
               <a:t>[1] </a:t>
             </a:r>
             <a:r>
-              <a:rPr lang="pt-BR" sz="2400" dirty="0" err="1">
+              <a:rPr lang="pt-BR" sz="2000" dirty="0" err="1">
                 <a:latin typeface="Times New Roman" panose="02020603050405020304" pitchFamily="18" charset="0"/>
                 <a:cs typeface="Times New Roman" panose="02020603050405020304" pitchFamily="18" charset="0"/>
               </a:rPr>
               <a:t>IoT</a:t>
             </a:r>
-            <a:endParaRPr lang="pt-BR" sz="2400" dirty="0">
+            <a:endParaRPr lang="pt-BR" sz="2000" dirty="0">
               <a:latin typeface="Times New Roman" panose="02020603050405020304" pitchFamily="18" charset="0"/>
               <a:cs typeface="Times New Roman" panose="02020603050405020304" pitchFamily="18" charset="0"/>
             </a:endParaRPr>
@@ -8403,7 +8634,7 @@
               <a:buNone/>
             </a:pPr>
             <a:r>
-              <a:rPr lang="pt-BR" sz="2400" b="1" dirty="0">
+              <a:rPr lang="pt-BR" sz="2000" b="1" dirty="0">
                 <a:solidFill>
                   <a:srgbClr val="FF0000"/>
                 </a:solidFill>
@@ -8413,14 +8644,14 @@
               <a:t>Disponível em: </a:t>
             </a:r>
             <a:r>
-              <a:rPr lang="pt-BR" sz="2400" dirty="0">
+              <a:rPr lang="pt-BR" sz="2000" dirty="0">
                 <a:latin typeface="Times New Roman" panose="02020603050405020304" pitchFamily="18" charset="0"/>
                 <a:cs typeface="Times New Roman" panose="02020603050405020304" pitchFamily="18" charset="0"/>
                 <a:hlinkClick r:id="rId3"/>
               </a:rPr>
-              <a:t>https://www.youtube.com/watch?v=jlkvzcG1UMk</a:t>
-            </a:r>
-            <a:endParaRPr lang="pt-BR" sz="2400" dirty="0">
+              <a:t>https://azure.microsoft.com/pt-br/resources/cloud-computing-dictionary/what-is-iot/</a:t>
+            </a:r>
+            <a:endParaRPr lang="pt-BR" sz="2000" dirty="0">
               <a:latin typeface="Times New Roman" panose="02020603050405020304" pitchFamily="18" charset="0"/>
               <a:cs typeface="Times New Roman" panose="02020603050405020304" pitchFamily="18" charset="0"/>
             </a:endParaRPr>
@@ -8429,7 +8660,7 @@
             <a:pPr marL="0" indent="0" algn="just">
               <a:buNone/>
             </a:pPr>
-            <a:endParaRPr lang="pt-BR" sz="2400" dirty="0">
+            <a:endParaRPr lang="pt-BR" sz="2000" dirty="0">
               <a:latin typeface="Times New Roman" panose="02020603050405020304" pitchFamily="18" charset="0"/>
               <a:cs typeface="Times New Roman" panose="02020603050405020304" pitchFamily="18" charset="0"/>
             </a:endParaRPr>
@@ -8439,21 +8670,21 @@
               <a:buNone/>
             </a:pPr>
             <a:r>
-              <a:rPr lang="pt-BR" sz="2400" dirty="0">
+              <a:rPr lang="pt-BR" sz="2000" dirty="0">
                 <a:latin typeface="Times New Roman" panose="02020603050405020304" pitchFamily="18" charset="0"/>
                 <a:cs typeface="Times New Roman" panose="02020603050405020304" pitchFamily="18" charset="0"/>
               </a:rPr>
               <a:t>[2] </a:t>
             </a:r>
             <a:r>
-              <a:rPr lang="pt-BR" sz="2400" dirty="0" err="1">
+              <a:rPr lang="pt-BR" sz="2000" dirty="0" err="1">
                 <a:latin typeface="Times New Roman" panose="02020603050405020304" pitchFamily="18" charset="0"/>
                 <a:cs typeface="Times New Roman" panose="02020603050405020304" pitchFamily="18" charset="0"/>
               </a:rPr>
               <a:t>IoT</a:t>
             </a:r>
             <a:r>
-              <a:rPr lang="pt-BR" sz="2400" dirty="0">
+              <a:rPr lang="pt-BR" sz="2000" dirty="0">
                 <a:latin typeface="Times New Roman" panose="02020603050405020304" pitchFamily="18" charset="0"/>
                 <a:cs typeface="Times New Roman" panose="02020603050405020304" pitchFamily="18" charset="0"/>
               </a:rPr>
@@ -8465,24 +8696,24 @@
               <a:buNone/>
             </a:pPr>
             <a:r>
-              <a:rPr lang="pt-BR" sz="2400" b="1" dirty="0">
+              <a:rPr lang="pt-BR" sz="2000" b="1" dirty="0">
                 <a:solidFill>
                   <a:srgbClr val="FF0000"/>
                 </a:solidFill>
                 <a:latin typeface="Times New Roman" panose="02020603050405020304" pitchFamily="18" charset="0"/>
                 <a:cs typeface="Times New Roman" panose="02020603050405020304" pitchFamily="18" charset="0"/>
               </a:rPr>
-              <a:t>Disponível em: 							</a:t>
-            </a:r>
-            <a:r>
-              <a:rPr lang="pt-BR" sz="2400" dirty="0">
+              <a:t>Disponível em: </a:t>
+            </a:r>
+            <a:r>
+              <a:rPr lang="pt-BR" sz="2000" dirty="0">
                 <a:latin typeface="Times New Roman" panose="02020603050405020304" pitchFamily="18" charset="0"/>
                 <a:cs typeface="Times New Roman" panose="02020603050405020304" pitchFamily="18" charset="0"/>
                 <a:hlinkClick r:id="rId4"/>
               </a:rPr>
-              <a:t>https://www.intel.com.br/content/www/br/pt/design/technologies-and-topics/iot/manageability.html</a:t>
-            </a:r>
-            <a:endParaRPr lang="pt-BR" sz="2400" dirty="0">
+              <a:t>https://www.sap.com/brazil/insights/what-is-iot-internet-of-things.html</a:t>
+            </a:r>
+            <a:endParaRPr lang="pt-BR" sz="2000" dirty="0">
               <a:latin typeface="Times New Roman" panose="02020603050405020304" pitchFamily="18" charset="0"/>
               <a:cs typeface="Times New Roman" panose="02020603050405020304" pitchFamily="18" charset="0"/>
             </a:endParaRPr>
@@ -8491,9 +8722,79 @@
             <a:pPr marL="0" indent="0" algn="just">
               <a:buNone/>
             </a:pPr>
-            <a:endParaRPr lang="pt-BR" sz="2400" dirty="0">
+            <a:endParaRPr lang="pt-BR" sz="2000" dirty="0">
               <a:latin typeface="Times New Roman" panose="02020603050405020304" pitchFamily="18" charset="0"/>
               <a:cs typeface="Times New Roman" panose="02020603050405020304" pitchFamily="18" charset="0"/>
+            </a:endParaRPr>
+          </a:p>
+          <a:p>
+            <a:pPr marL="0" indent="0" algn="just">
+              <a:buNone/>
+            </a:pPr>
+            <a:r>
+              <a:rPr lang="pt-BR" sz="2000" dirty="0">
+                <a:latin typeface="Times New Roman" panose="02020603050405020304" pitchFamily="18" charset="0"/>
+                <a:cs typeface="Times New Roman" panose="02020603050405020304" pitchFamily="18" charset="0"/>
+              </a:rPr>
+              <a:t>[3] </a:t>
+            </a:r>
+            <a:r>
+              <a:rPr lang="pt-BR" sz="2000" dirty="0" err="1">
+                <a:latin typeface="Times New Roman" panose="02020603050405020304" pitchFamily="18" charset="0"/>
+                <a:cs typeface="Times New Roman" panose="02020603050405020304" pitchFamily="18" charset="0"/>
+              </a:rPr>
+              <a:t>IoT</a:t>
+            </a:r>
+            <a:r>
+              <a:rPr lang="pt-BR" sz="2000" dirty="0">
+                <a:latin typeface="Times New Roman" panose="02020603050405020304" pitchFamily="18" charset="0"/>
+                <a:cs typeface="Times New Roman" panose="02020603050405020304" pitchFamily="18" charset="0"/>
+              </a:rPr>
+              <a:t> </a:t>
+            </a:r>
+          </a:p>
+          <a:p>
+            <a:pPr marL="0" indent="0" algn="just">
+              <a:buNone/>
+            </a:pPr>
+            <a:r>
+              <a:rPr lang="pt-BR" sz="2000" b="1" dirty="0">
+                <a:solidFill>
+                  <a:srgbClr val="FF0000"/>
+                </a:solidFill>
+                <a:latin typeface="Times New Roman" panose="02020603050405020304" pitchFamily="18" charset="0"/>
+                <a:cs typeface="Times New Roman" panose="02020603050405020304" pitchFamily="18" charset="0"/>
+              </a:rPr>
+              <a:t>Disponível em: </a:t>
+            </a:r>
+            <a:r>
+              <a:rPr lang="pt-BR" sz="2000" dirty="0">
+                <a:latin typeface="Times New Roman" panose="02020603050405020304" pitchFamily="18" charset="0"/>
+                <a:cs typeface="Times New Roman" panose="02020603050405020304" pitchFamily="18" charset="0"/>
+                <a:hlinkClick r:id="rId5"/>
+              </a:rPr>
+              <a:t>https://tecnoblog.net/responde/o-que-e-internet-das-coisas/</a:t>
+            </a:r>
+            <a:endParaRPr lang="pt-BR" sz="2000" dirty="0">
+              <a:latin typeface="Times New Roman" panose="02020603050405020304" pitchFamily="18" charset="0"/>
+              <a:cs typeface="Times New Roman" panose="02020603050405020304" pitchFamily="18" charset="0"/>
+            </a:endParaRPr>
+          </a:p>
+          <a:p>
+            <a:pPr marL="0" indent="0" algn="just">
+              <a:buNone/>
+            </a:pPr>
+            <a:endParaRPr lang="pt-BR" sz="2000" dirty="0">
+              <a:latin typeface="Times New Roman" panose="02020603050405020304" pitchFamily="18" charset="0"/>
+              <a:cs typeface="Times New Roman" panose="02020603050405020304" pitchFamily="18" charset="0"/>
+            </a:endParaRPr>
+          </a:p>
+          <a:p>
+            <a:pPr marL="0" indent="0" algn="just">
+              <a:buNone/>
+            </a:pPr>
+            <a:endParaRPr lang="pt-BR" sz="2000" dirty="0">
+              <a:latin typeface="Calibri" panose="020F0502020204030204" pitchFamily="34" charset="0"/>
             </a:endParaRPr>
           </a:p>
         </p:txBody>
@@ -8501,7 +8802,7 @@
     </p:spTree>
     <p:extLst>
       <p:ext uri="{BB962C8B-B14F-4D97-AF65-F5344CB8AC3E}">
-        <p14:creationId xmlns:p14="http://schemas.microsoft.com/office/powerpoint/2010/main" val="2747596967"/>
+        <p14:creationId xmlns:p14="http://schemas.microsoft.com/office/powerpoint/2010/main" val="3680270425"/>
       </p:ext>
     </p:extLst>
   </p:cSld>
@@ -8557,7 +8858,7 @@
                   <a:srgbClr val="0070C0"/>
                 </a:solidFill>
               </a:rPr>
-              <a:t>Dinâmica</a:t>
+              <a:t>Aprenda</a:t>
             </a:r>
             <a:r>
               <a:rPr lang="en-US" b="1" dirty="0">
@@ -8565,21 +8866,8 @@
                   <a:srgbClr val="0070C0"/>
                 </a:solidFill>
               </a:rPr>
-              <a:t>/</a:t>
-            </a:r>
-            <a:r>
-              <a:rPr lang="en-US" b="1" dirty="0" err="1">
-                <a:solidFill>
-                  <a:srgbClr val="0070C0"/>
-                </a:solidFill>
-              </a:rPr>
-              <a:t>Atividades</a:t>
-            </a:r>
-            <a:endParaRPr lang="en-US" b="1" dirty="0">
-              <a:solidFill>
-                <a:srgbClr val="0070C0"/>
-              </a:solidFill>
-            </a:endParaRPr>
+              <a:t>+</a:t>
+            </a:r>
           </a:p>
         </p:txBody>
       </p:sp>
@@ -8595,8 +8883,8 @@
         </p:nvSpPr>
         <p:spPr>
           <a:xfrm>
-            <a:off x="139472" y="1063230"/>
-            <a:ext cx="8865056" cy="3606305"/>
+            <a:off x="142865" y="1200150"/>
+            <a:ext cx="8865056" cy="3737370"/>
           </a:xfrm>
         </p:spPr>
         <p:txBody>
@@ -8608,67 +8896,121 @@
             <a:pPr marL="0" indent="0" algn="just">
               <a:buNone/>
             </a:pPr>
-            <a:endParaRPr lang="pt-BR" dirty="0">
+            <a:r>
+              <a:rPr lang="pt-BR" sz="2400" dirty="0">
+                <a:latin typeface="Times New Roman" panose="02020603050405020304" pitchFamily="18" charset="0"/>
+                <a:cs typeface="Times New Roman" panose="02020603050405020304" pitchFamily="18" charset="0"/>
+              </a:rPr>
+              <a:t>[1] </a:t>
+            </a:r>
+            <a:r>
+              <a:rPr lang="pt-BR" sz="2400" dirty="0" err="1">
+                <a:latin typeface="Times New Roman" panose="02020603050405020304" pitchFamily="18" charset="0"/>
+                <a:cs typeface="Times New Roman" panose="02020603050405020304" pitchFamily="18" charset="0"/>
+              </a:rPr>
+              <a:t>IoT</a:t>
+            </a:r>
+            <a:endParaRPr lang="pt-BR" sz="2400" dirty="0">
               <a:latin typeface="Times New Roman" panose="02020603050405020304" pitchFamily="18" charset="0"/>
               <a:cs typeface="Times New Roman" panose="02020603050405020304" pitchFamily="18" charset="0"/>
             </a:endParaRPr>
           </a:p>
           <a:p>
-            <a:pPr algn="just">
-              <a:buFont typeface="Wingdings" panose="05000000000000000000" pitchFamily="2" charset="2"/>
-              <a:buChar char="§"/>
+            <a:pPr marL="0" indent="0" algn="just">
+              <a:buNone/>
             </a:pPr>
             <a:r>
-              <a:rPr lang="pt-BR" dirty="0">
-                <a:latin typeface="Times New Roman" panose="02020603050405020304" pitchFamily="18" charset="0"/>
-                <a:cs typeface="Times New Roman" panose="02020603050405020304" pitchFamily="18" charset="0"/>
-              </a:rPr>
-              <a:t>Exercícios (Atividade Verificadora de Aprendizagem)</a:t>
-            </a:r>
-          </a:p>
-          <a:p>
-            <a:pPr marL="0" indent="0" algn="just">
-              <a:buNone/>
-            </a:pPr>
-            <a:r>
-              <a:rPr lang="pt-BR" dirty="0">
-                <a:latin typeface="Times New Roman" panose="02020603050405020304" pitchFamily="18" charset="0"/>
-                <a:cs typeface="Times New Roman" panose="02020603050405020304" pitchFamily="18" charset="0"/>
-              </a:rPr>
-              <a:t> 	</a:t>
-            </a:r>
-            <a:r>
-              <a:rPr lang="pt-BR" dirty="0">
+              <a:rPr lang="pt-BR" sz="2400" b="1" dirty="0">
+                <a:solidFill>
+                  <a:srgbClr val="FF0000"/>
+                </a:solidFill>
+                <a:latin typeface="Times New Roman" panose="02020603050405020304" pitchFamily="18" charset="0"/>
+                <a:cs typeface="Times New Roman" panose="02020603050405020304" pitchFamily="18" charset="0"/>
+              </a:rPr>
+              <a:t>Disponível em: </a:t>
+            </a:r>
+            <a:r>
+              <a:rPr lang="pt-BR" sz="2400" dirty="0">
                 <a:latin typeface="Times New Roman" panose="02020603050405020304" pitchFamily="18" charset="0"/>
                 <a:cs typeface="Times New Roman" panose="02020603050405020304" pitchFamily="18" charset="0"/>
                 <a:hlinkClick r:id="rId3"/>
               </a:rPr>
-              <a:t>https://quizizz.com/admin/quiz/5d8954fda0089a001c105c1e</a:t>
-            </a:r>
-            <a:r>
-              <a:rPr lang="pt-BR">
-                <a:latin typeface="Times New Roman" panose="02020603050405020304" pitchFamily="18" charset="0"/>
-                <a:cs typeface="Times New Roman" panose="02020603050405020304" pitchFamily="18" charset="0"/>
-                <a:hlinkClick r:id="rId3"/>
-              </a:rPr>
-              <a:t>/internet-das-coisas</a:t>
-            </a:r>
-            <a:endParaRPr lang="pt-BR" dirty="0">
+              <a:t>https://www.youtube.com/watch?v=jlkvzcG1UMk</a:t>
+            </a:r>
+            <a:endParaRPr lang="pt-BR" sz="2400" dirty="0">
               <a:latin typeface="Times New Roman" panose="02020603050405020304" pitchFamily="18" charset="0"/>
               <a:cs typeface="Times New Roman" panose="02020603050405020304" pitchFamily="18" charset="0"/>
             </a:endParaRPr>
           </a:p>
           <a:p>
-            <a:pPr algn="just"/>
-            <a:endParaRPr lang="pt-BR" dirty="0">
+            <a:pPr marL="0" indent="0" algn="just">
+              <a:buNone/>
+            </a:pPr>
+            <a:endParaRPr lang="pt-BR" sz="2400" dirty="0">
               <a:latin typeface="Times New Roman" panose="02020603050405020304" pitchFamily="18" charset="0"/>
               <a:cs typeface="Times New Roman" panose="02020603050405020304" pitchFamily="18" charset="0"/>
             </a:endParaRPr>
           </a:p>
           <a:p>
-            <a:pPr algn="just"/>
-            <a:endParaRPr lang="pt-BR" dirty="0">
-              <a:latin typeface="Calibri" panose="020F0502020204030204" pitchFamily="34" charset="0"/>
+            <a:pPr marL="0" indent="0" algn="just">
+              <a:buNone/>
+            </a:pPr>
+            <a:r>
+              <a:rPr lang="pt-BR" sz="2400" dirty="0">
+                <a:latin typeface="Times New Roman" panose="02020603050405020304" pitchFamily="18" charset="0"/>
+                <a:cs typeface="Times New Roman" panose="02020603050405020304" pitchFamily="18" charset="0"/>
+              </a:rPr>
+              <a:t>[2] </a:t>
+            </a:r>
+            <a:r>
+              <a:rPr lang="pt-BR" sz="2400" dirty="0" err="1">
+                <a:latin typeface="Times New Roman" panose="02020603050405020304" pitchFamily="18" charset="0"/>
+                <a:cs typeface="Times New Roman" panose="02020603050405020304" pitchFamily="18" charset="0"/>
+              </a:rPr>
+              <a:t>IoT</a:t>
+            </a:r>
+            <a:r>
+              <a:rPr lang="pt-BR" sz="2400" dirty="0">
+                <a:latin typeface="Times New Roman" panose="02020603050405020304" pitchFamily="18" charset="0"/>
+                <a:cs typeface="Times New Roman" panose="02020603050405020304" pitchFamily="18" charset="0"/>
+              </a:rPr>
+              <a:t> </a:t>
+            </a:r>
+          </a:p>
+          <a:p>
+            <a:pPr marL="0" indent="0" algn="just">
+              <a:buNone/>
+            </a:pPr>
+            <a:r>
+              <a:rPr lang="pt-BR" sz="2400" b="1" dirty="0">
+                <a:solidFill>
+                  <a:srgbClr val="FF0000"/>
+                </a:solidFill>
+                <a:latin typeface="Times New Roman" panose="02020603050405020304" pitchFamily="18" charset="0"/>
+                <a:cs typeface="Times New Roman" panose="02020603050405020304" pitchFamily="18" charset="0"/>
+              </a:rPr>
+              <a:t>Disponível em: 							</a:t>
+            </a:r>
+            <a:r>
+              <a:rPr lang="pt-BR" sz="2400" dirty="0">
+                <a:latin typeface="Times New Roman" panose="02020603050405020304" pitchFamily="18" charset="0"/>
+                <a:cs typeface="Times New Roman" panose="02020603050405020304" pitchFamily="18" charset="0"/>
+                <a:hlinkClick r:id="rId4"/>
+              </a:rPr>
+              <a:t>https://www.intel.com.br/content/www/br/pt/design/technologies-and-topics/iot/manageability.html</a:t>
+            </a:r>
+            <a:endParaRPr lang="pt-BR" sz="2400" dirty="0">
+              <a:latin typeface="Times New Roman" panose="02020603050405020304" pitchFamily="18" charset="0"/>
+              <a:cs typeface="Times New Roman" panose="02020603050405020304" pitchFamily="18" charset="0"/>
+            </a:endParaRPr>
+          </a:p>
+          <a:p>
+            <a:pPr marL="0" indent="0" algn="just">
+              <a:buNone/>
+            </a:pPr>
+            <a:endParaRPr lang="pt-BR" sz="2400" dirty="0">
+              <a:latin typeface="Times New Roman" panose="02020603050405020304" pitchFamily="18" charset="0"/>
+              <a:cs typeface="Times New Roman" panose="02020603050405020304" pitchFamily="18" charset="0"/>
             </a:endParaRPr>
           </a:p>
         </p:txBody>
@@ -8676,7 +9018,7 @@
     </p:spTree>
     <p:extLst>
       <p:ext uri="{BB962C8B-B14F-4D97-AF65-F5344CB8AC3E}">
-        <p14:creationId xmlns:p14="http://schemas.microsoft.com/office/powerpoint/2010/main" val="2470652989"/>
+        <p14:creationId xmlns:p14="http://schemas.microsoft.com/office/powerpoint/2010/main" val="2747596967"/>
       </p:ext>
     </p:extLst>
   </p:cSld>
@@ -8732,6 +9074,181 @@
                   <a:srgbClr val="0070C0"/>
                 </a:solidFill>
               </a:rPr>
+              <a:t>Dinâmica</a:t>
+            </a:r>
+            <a:r>
+              <a:rPr lang="en-US" b="1" dirty="0">
+                <a:solidFill>
+                  <a:srgbClr val="0070C0"/>
+                </a:solidFill>
+              </a:rPr>
+              <a:t>/</a:t>
+            </a:r>
+            <a:r>
+              <a:rPr lang="en-US" b="1" dirty="0" err="1">
+                <a:solidFill>
+                  <a:srgbClr val="0070C0"/>
+                </a:solidFill>
+              </a:rPr>
+              <a:t>Atividades</a:t>
+            </a:r>
+            <a:endParaRPr lang="en-US" b="1" dirty="0">
+              <a:solidFill>
+                <a:srgbClr val="0070C0"/>
+              </a:solidFill>
+            </a:endParaRPr>
+          </a:p>
+        </p:txBody>
+      </p:sp>
+      <p:sp>
+        <p:nvSpPr>
+          <p:cNvPr id="8" name="Text Placeholder 2"/>
+          <p:cNvSpPr>
+            <a:spLocks noGrp="1"/>
+          </p:cNvSpPr>
+          <p:nvPr>
+            <p:ph type="body" sz="half" idx="1"/>
+          </p:nvPr>
+        </p:nvSpPr>
+        <p:spPr>
+          <a:xfrm>
+            <a:off x="139472" y="1063230"/>
+            <a:ext cx="8865056" cy="3606305"/>
+          </a:xfrm>
+        </p:spPr>
+        <p:txBody>
+          <a:bodyPr>
+            <a:noAutofit/>
+          </a:bodyPr>
+          <a:lstStyle/>
+          <a:p>
+            <a:pPr marL="0" indent="0" algn="just">
+              <a:buNone/>
+            </a:pPr>
+            <a:endParaRPr lang="pt-BR" dirty="0">
+              <a:latin typeface="Times New Roman" panose="02020603050405020304" pitchFamily="18" charset="0"/>
+              <a:cs typeface="Times New Roman" panose="02020603050405020304" pitchFamily="18" charset="0"/>
+            </a:endParaRPr>
+          </a:p>
+          <a:p>
+            <a:pPr algn="just">
+              <a:buFont typeface="Wingdings" panose="05000000000000000000" pitchFamily="2" charset="2"/>
+              <a:buChar char="§"/>
+            </a:pPr>
+            <a:r>
+              <a:rPr lang="pt-BR" dirty="0">
+                <a:latin typeface="Times New Roman" panose="02020603050405020304" pitchFamily="18" charset="0"/>
+                <a:cs typeface="Times New Roman" panose="02020603050405020304" pitchFamily="18" charset="0"/>
+              </a:rPr>
+              <a:t>Exercícios (Atividade Verificadora de Aprendizagem)</a:t>
+            </a:r>
+          </a:p>
+          <a:p>
+            <a:pPr marL="0" indent="0" algn="just">
+              <a:buNone/>
+            </a:pPr>
+            <a:r>
+              <a:rPr lang="pt-BR" dirty="0">
+                <a:latin typeface="Times New Roman" panose="02020603050405020304" pitchFamily="18" charset="0"/>
+                <a:cs typeface="Times New Roman" panose="02020603050405020304" pitchFamily="18" charset="0"/>
+              </a:rPr>
+              <a:t> 	</a:t>
+            </a:r>
+            <a:r>
+              <a:rPr lang="pt-BR" dirty="0">
+                <a:latin typeface="Times New Roman" panose="02020603050405020304" pitchFamily="18" charset="0"/>
+                <a:cs typeface="Times New Roman" panose="02020603050405020304" pitchFamily="18" charset="0"/>
+                <a:hlinkClick r:id="rId3"/>
+              </a:rPr>
+              <a:t>https://quizizz.com/admin/quiz/5d8954fda0089a001c105c1e</a:t>
+            </a:r>
+            <a:r>
+              <a:rPr lang="pt-BR">
+                <a:latin typeface="Times New Roman" panose="02020603050405020304" pitchFamily="18" charset="0"/>
+                <a:cs typeface="Times New Roman" panose="02020603050405020304" pitchFamily="18" charset="0"/>
+                <a:hlinkClick r:id="rId3"/>
+              </a:rPr>
+              <a:t>/internet-das-coisas</a:t>
+            </a:r>
+            <a:endParaRPr lang="pt-BR" dirty="0">
+              <a:latin typeface="Times New Roman" panose="02020603050405020304" pitchFamily="18" charset="0"/>
+              <a:cs typeface="Times New Roman" panose="02020603050405020304" pitchFamily="18" charset="0"/>
+            </a:endParaRPr>
+          </a:p>
+          <a:p>
+            <a:pPr algn="just"/>
+            <a:endParaRPr lang="pt-BR" dirty="0">
+              <a:latin typeface="Times New Roman" panose="02020603050405020304" pitchFamily="18" charset="0"/>
+              <a:cs typeface="Times New Roman" panose="02020603050405020304" pitchFamily="18" charset="0"/>
+            </a:endParaRPr>
+          </a:p>
+          <a:p>
+            <a:pPr algn="just"/>
+            <a:endParaRPr lang="pt-BR" dirty="0">
+              <a:latin typeface="Calibri" panose="020F0502020204030204" pitchFamily="34" charset="0"/>
+            </a:endParaRPr>
+          </a:p>
+        </p:txBody>
+      </p:sp>
+    </p:spTree>
+    <p:extLst>
+      <p:ext uri="{BB962C8B-B14F-4D97-AF65-F5344CB8AC3E}">
+        <p14:creationId xmlns:p14="http://schemas.microsoft.com/office/powerpoint/2010/main" val="2470652989"/>
+      </p:ext>
+    </p:extLst>
+  </p:cSld>
+  <p:clrMapOvr>
+    <a:masterClrMapping/>
+  </p:clrMapOvr>
+  <p:transition spd="med"/>
+</p:sld>
+</file>
+
+<file path=ppt/slides/slide23.xml><?xml version="1.0" encoding="utf-8"?>
+<p:sld xmlns:a="http://schemas.openxmlformats.org/drawingml/2006/main" xmlns:r="http://schemas.openxmlformats.org/officeDocument/2006/relationships" xmlns:p="http://schemas.openxmlformats.org/presentationml/2006/main">
+  <p:cSld>
+    <p:spTree>
+      <p:nvGrpSpPr>
+        <p:cNvPr id="1" name=""/>
+        <p:cNvGrpSpPr/>
+        <p:nvPr/>
+      </p:nvGrpSpPr>
+      <p:grpSpPr>
+        <a:xfrm>
+          <a:off x="0" y="0"/>
+          <a:ext cx="0" cy="0"/>
+          <a:chOff x="0" y="0"/>
+          <a:chExt cx="0" cy="0"/>
+        </a:xfrm>
+      </p:grpSpPr>
+      <p:sp>
+        <p:nvSpPr>
+          <p:cNvPr id="6" name="Title 1"/>
+          <p:cNvSpPr>
+            <a:spLocks noGrp="1"/>
+          </p:cNvSpPr>
+          <p:nvPr>
+            <p:ph type="title"/>
+          </p:nvPr>
+        </p:nvSpPr>
+        <p:spPr>
+          <a:xfrm>
+            <a:off x="457200" y="205980"/>
+            <a:ext cx="8229600" cy="857251"/>
+          </a:xfrm>
+        </p:spPr>
+        <p:txBody>
+          <a:bodyPr>
+            <a:normAutofit/>
+          </a:bodyPr>
+          <a:lstStyle/>
+          <a:p>
+            <a:r>
+              <a:rPr lang="en-US" b="1" dirty="0" err="1">
+                <a:solidFill>
+                  <a:srgbClr val="0070C0"/>
+                </a:solidFill>
+              </a:rPr>
               <a:t>Referências</a:t>
             </a:r>
             <a:r>
@@ -8941,7 +9458,7 @@
 </p:sld>
 </file>
 
-<file path=ppt/slides/slide23.xml><?xml version="1.0" encoding="utf-8"?>
+<file path=ppt/slides/slide24.xml><?xml version="1.0" encoding="utf-8"?>
 <p:sld xmlns:a="http://schemas.openxmlformats.org/drawingml/2006/main" xmlns:r="http://schemas.openxmlformats.org/officeDocument/2006/relationships" xmlns:p="http://schemas.openxmlformats.org/presentationml/2006/main">
   <p:cSld>
     <p:spTree>

</xml_diff>

<commit_message>
aula 02 Cloud Indústria 4.0 IoT Python 13032023
</commit_message>
<xml_diff>
--- a/01 Classes/Aula 01 - Aplicação Cloud Indústria 40 Python.pptx
+++ b/01 Classes/Aula 01 - Aplicação Cloud Indústria 40 Python.pptx
@@ -9305,7 +9305,41 @@
                 <a:latin typeface="Times New Roman" panose="02020603050405020304" pitchFamily="18" charset="0"/>
                 <a:cs typeface="Times New Roman" panose="02020603050405020304" pitchFamily="18" charset="0"/>
               </a:rPr>
-              <a:t>[1] MAGRANI, Eduardo. A internet das coisas. Editora FGV, 2018.</a:t>
+              <a:t>[1] </a:t>
+            </a:r>
+            <a:r>
+              <a:rPr lang="pt-BR" sz="2000" b="1" dirty="0">
+                <a:solidFill>
+                  <a:srgbClr val="FF0000"/>
+                </a:solidFill>
+                <a:latin typeface="Times New Roman" panose="02020603050405020304" pitchFamily="18" charset="0"/>
+                <a:cs typeface="Times New Roman" panose="02020603050405020304" pitchFamily="18" charset="0"/>
+              </a:rPr>
+              <a:t>MAGRANI</a:t>
+            </a:r>
+            <a:r>
+              <a:rPr lang="pt-BR" sz="2000" dirty="0">
+                <a:latin typeface="Times New Roman" panose="02020603050405020304" pitchFamily="18" charset="0"/>
+                <a:cs typeface="Times New Roman" panose="02020603050405020304" pitchFamily="18" charset="0"/>
+              </a:rPr>
+              <a:t>, </a:t>
+            </a:r>
+            <a:r>
+              <a:rPr lang="pt-BR" sz="2000" b="1" dirty="0">
+                <a:solidFill>
+                  <a:srgbClr val="FF0000"/>
+                </a:solidFill>
+                <a:latin typeface="Times New Roman" panose="02020603050405020304" pitchFamily="18" charset="0"/>
+                <a:cs typeface="Times New Roman" panose="02020603050405020304" pitchFamily="18" charset="0"/>
+              </a:rPr>
+              <a:t>Eduardo</a:t>
+            </a:r>
+            <a:r>
+              <a:rPr lang="pt-BR" sz="2000" dirty="0">
+                <a:latin typeface="Times New Roman" panose="02020603050405020304" pitchFamily="18" charset="0"/>
+                <a:cs typeface="Times New Roman" panose="02020603050405020304" pitchFamily="18" charset="0"/>
+              </a:rPr>
+              <a:t>. A internet das coisas. Editora FGV, 2018.</a:t>
             </a:r>
           </a:p>
           <a:p>
@@ -9326,7 +9360,24 @@
                 <a:latin typeface="Times New Roman" panose="02020603050405020304" pitchFamily="18" charset="0"/>
                 <a:cs typeface="Times New Roman" panose="02020603050405020304" pitchFamily="18" charset="0"/>
               </a:rPr>
-              <a:t>[2] Pires, Paulo F., et al. "Plataformas para a internet das coisas." Minicursos SBRC-Simpósio Brasileiro de Redes de Computadores e Sistemas Distribuídos (2015).</a:t>
+              <a:t>[2] </a:t>
+            </a:r>
+            <a:r>
+              <a:rPr lang="pt-BR" sz="2000" b="1" dirty="0">
+                <a:solidFill>
+                  <a:srgbClr val="FF0000"/>
+                </a:solidFill>
+                <a:latin typeface="Times New Roman" panose="02020603050405020304" pitchFamily="18" charset="0"/>
+                <a:cs typeface="Times New Roman" panose="02020603050405020304" pitchFamily="18" charset="0"/>
+              </a:rPr>
+              <a:t>Pires, Paulo F., </a:t>
+            </a:r>
+            <a:r>
+              <a:rPr lang="pt-BR" sz="2000" dirty="0">
+                <a:latin typeface="Times New Roman" panose="02020603050405020304" pitchFamily="18" charset="0"/>
+                <a:cs typeface="Times New Roman" panose="02020603050405020304" pitchFamily="18" charset="0"/>
+              </a:rPr>
+              <a:t>et al. "Plataformas para a internet das coisas." Minicursos SBRC-Simpósio Brasileiro de Redes de Computadores e Sistemas Distribuídos (2015).</a:t>
             </a:r>
             <a:endParaRPr lang="pt-BR" sz="2000" dirty="0">
               <a:latin typeface="Calibri" panose="020F0502020204030204" pitchFamily="34" charset="0"/>
@@ -9351,28 +9402,46 @@
               <a:t>[3] </a:t>
             </a:r>
             <a:r>
-              <a:rPr lang="pt-BR" sz="2000" dirty="0" err="1">
+              <a:rPr lang="pt-BR" sz="2000" b="1" dirty="0" err="1">
+                <a:solidFill>
+                  <a:srgbClr val="FF0000"/>
+                </a:solidFill>
                 <a:latin typeface="Calibri" panose="020F0502020204030204" pitchFamily="34" charset="0"/>
               </a:rPr>
               <a:t>Carrion</a:t>
+            </a:r>
+            <a:r>
+              <a:rPr lang="pt-BR" sz="2000" b="1" dirty="0">
+                <a:solidFill>
+                  <a:srgbClr val="FF0000"/>
+                </a:solidFill>
+                <a:latin typeface="Calibri" panose="020F0502020204030204" pitchFamily="34" charset="0"/>
+              </a:rPr>
+              <a:t>, Patrícia, </a:t>
+            </a:r>
+            <a:r>
+              <a:rPr lang="pt-BR" sz="2000" b="1" dirty="0" err="1">
+                <a:solidFill>
+                  <a:srgbClr val="FF0000"/>
+                </a:solidFill>
+                <a:latin typeface="Calibri" panose="020F0502020204030204" pitchFamily="34" charset="0"/>
+              </a:rPr>
+              <a:t>and</a:t>
+            </a:r>
+            <a:r>
+              <a:rPr lang="pt-BR" sz="2000" b="1" dirty="0">
+                <a:solidFill>
+                  <a:srgbClr val="FF0000"/>
+                </a:solidFill>
+                <a:latin typeface="Calibri" panose="020F0502020204030204" pitchFamily="34" charset="0"/>
+              </a:rPr>
+              <a:t> Manuela Quaresma</a:t>
             </a:r>
             <a:r>
               <a:rPr lang="pt-BR" sz="2000" dirty="0">
                 <a:latin typeface="Calibri" panose="020F0502020204030204" pitchFamily="34" charset="0"/>
               </a:rPr>
-              <a:t>, Patrícia, </a:t>
-            </a:r>
-            <a:r>
-              <a:rPr lang="pt-BR" sz="2000" dirty="0" err="1">
-                <a:latin typeface="Calibri" panose="020F0502020204030204" pitchFamily="34" charset="0"/>
-              </a:rPr>
-              <a:t>and</a:t>
-            </a:r>
-            <a:r>
-              <a:rPr lang="pt-BR" sz="2000" dirty="0">
-                <a:latin typeface="Calibri" panose="020F0502020204030204" pitchFamily="34" charset="0"/>
-              </a:rPr>
-              <a:t> Manuela Quaresma. "Internet da Coisas (</a:t>
+              <a:t>. "Internet da Coisas (</a:t>
             </a:r>
             <a:r>
               <a:rPr lang="pt-BR" sz="2000" dirty="0" err="1">
@@ -9427,7 +9496,22 @@
               <a:rPr lang="pt-BR" sz="2000" dirty="0">
                 <a:latin typeface="Calibri" panose="020F0502020204030204" pitchFamily="34" charset="0"/>
               </a:rPr>
-              <a:t>[4] Santos, Bruno P., et al. "Internet das coisas: da teoria à prática." Minicursos SBRC-Simpósio Brasileiro de Redes de Computadores e Sistemas </a:t>
+              <a:t>[4] </a:t>
+            </a:r>
+            <a:r>
+              <a:rPr lang="pt-BR" sz="2000" b="1" dirty="0">
+                <a:solidFill>
+                  <a:srgbClr val="FF0000"/>
+                </a:solidFill>
+                <a:latin typeface="Calibri" panose="020F0502020204030204" pitchFamily="34" charset="0"/>
+              </a:rPr>
+              <a:t>Santos, Bruno P., </a:t>
+            </a:r>
+            <a:r>
+              <a:rPr lang="pt-BR" sz="2000" dirty="0">
+                <a:latin typeface="Calibri" panose="020F0502020204030204" pitchFamily="34" charset="0"/>
+              </a:rPr>
+              <a:t>et al. "Internet das coisas: da teoria à prática." Minicursos SBRC-Simpósio Brasileiro de Redes de Computadores e Sistemas </a:t>
             </a:r>
             <a:r>
               <a:rPr lang="pt-BR" sz="2000" dirty="0" err="1">

</xml_diff>